<commit_message>
Disciplina CLP LADDER 27Mar2025
</commit_message>
<xml_diff>
--- a/01 Classes/Aula2 - CLP - Arquitetura.pptx
+++ b/01 Classes/Aula2 - CLP - Arquitetura.pptx
@@ -6126,130 +6126,20 @@
             <a:pPr marL="0" indent="0" algn="just">
               <a:buNone/>
             </a:pPr>
-            <a:endParaRPr lang="pt-BR" sz="2200" dirty="0">
-              <a:latin typeface="Times New Roman" panose="02020603050405020304" pitchFamily="18" charset="0"/>
-              <a:cs typeface="Times New Roman" panose="02020603050405020304" pitchFamily="18" charset="0"/>
-            </a:endParaRPr>
-          </a:p>
-          <a:p>
-            <a:pPr algn="just">
-              <a:buFont typeface="Wingdings" panose="05000000000000000000" pitchFamily="2" charset="2"/>
-              <a:buChar char="v"/>
-            </a:pPr>
-            <a:r>
-              <a:rPr lang="pt-BR" sz="2200" b="1" dirty="0">
-                <a:solidFill>
-                  <a:srgbClr val="FF0000"/>
-                </a:solidFill>
-                <a:latin typeface="Times New Roman" panose="02020603050405020304" pitchFamily="18" charset="0"/>
-                <a:cs typeface="Times New Roman" panose="02020603050405020304" pitchFamily="18" charset="0"/>
-              </a:rPr>
-              <a:t>Linguagens de programação gráficas e textuais</a:t>
-            </a:r>
             <a:r>
               <a:rPr lang="pt-BR" sz="2200" dirty="0">
                 <a:latin typeface="Times New Roman" panose="02020603050405020304" pitchFamily="18" charset="0"/>
                 <a:cs typeface="Times New Roman" panose="02020603050405020304" pitchFamily="18" charset="0"/>
-              </a:rPr>
-              <a:t>: </a:t>
-            </a:r>
-            <a:r>
-              <a:rPr lang="pt-BR" sz="2200" dirty="0" err="1">
-                <a:latin typeface="Times New Roman" panose="02020603050405020304" pitchFamily="18" charset="0"/>
-                <a:cs typeface="Times New Roman" panose="02020603050405020304" pitchFamily="18" charset="0"/>
-              </a:rPr>
-              <a:t>Ladder</a:t>
+                <a:hlinkClick r:id="rId3"/>
+              </a:rPr>
+              <a:t>https://www.iec.ch/homepage</a:t>
             </a:r>
             <a:r>
               <a:rPr lang="pt-BR" sz="2200" dirty="0">
                 <a:latin typeface="Times New Roman" panose="02020603050405020304" pitchFamily="18" charset="0"/>
                 <a:cs typeface="Times New Roman" panose="02020603050405020304" pitchFamily="18" charset="0"/>
               </a:rPr>
-              <a:t> (</a:t>
-            </a:r>
-            <a:r>
-              <a:rPr lang="pt-BR" sz="2200" b="1" dirty="0">
-                <a:latin typeface="Times New Roman" panose="02020603050405020304" pitchFamily="18" charset="0"/>
-                <a:cs typeface="Times New Roman" panose="02020603050405020304" pitchFamily="18" charset="0"/>
-              </a:rPr>
-              <a:t>LD</a:t>
-            </a:r>
-            <a:r>
-              <a:rPr lang="pt-BR" sz="2200" dirty="0">
-                <a:latin typeface="Times New Roman" panose="02020603050405020304" pitchFamily="18" charset="0"/>
-                <a:cs typeface="Times New Roman" panose="02020603050405020304" pitchFamily="18" charset="0"/>
-              </a:rPr>
-              <a:t>) (</a:t>
-            </a:r>
-            <a:r>
-              <a:rPr lang="pt-BR" sz="2200" b="1" dirty="0">
-                <a:latin typeface="Times New Roman" panose="02020603050405020304" pitchFamily="18" charset="0"/>
-                <a:cs typeface="Times New Roman" panose="02020603050405020304" pitchFamily="18" charset="0"/>
-              </a:rPr>
-              <a:t>ou Diagrama de Escada</a:t>
-            </a:r>
-            <a:r>
-              <a:rPr lang="pt-BR" sz="2200" dirty="0">
-                <a:latin typeface="Times New Roman" panose="02020603050405020304" pitchFamily="18" charset="0"/>
-                <a:cs typeface="Times New Roman" panose="02020603050405020304" pitchFamily="18" charset="0"/>
-              </a:rPr>
-              <a:t>) , Bloco Funcional (</a:t>
-            </a:r>
-            <a:r>
-              <a:rPr lang="pt-BR" sz="2200" b="1" dirty="0">
-                <a:latin typeface="Times New Roman" panose="02020603050405020304" pitchFamily="18" charset="0"/>
-                <a:cs typeface="Times New Roman" panose="02020603050405020304" pitchFamily="18" charset="0"/>
-              </a:rPr>
-              <a:t>FBD</a:t>
-            </a:r>
-            <a:r>
-              <a:rPr lang="pt-BR" sz="2200" dirty="0">
-                <a:latin typeface="Times New Roman" panose="02020603050405020304" pitchFamily="18" charset="0"/>
-                <a:cs typeface="Times New Roman" panose="02020603050405020304" pitchFamily="18" charset="0"/>
-              </a:rPr>
-              <a:t>), </a:t>
-            </a:r>
-            <a:r>
-              <a:rPr lang="pt-BR" sz="2200" dirty="0" err="1">
-                <a:latin typeface="Times New Roman" panose="02020603050405020304" pitchFamily="18" charset="0"/>
-                <a:cs typeface="Times New Roman" panose="02020603050405020304" pitchFamily="18" charset="0"/>
-              </a:rPr>
-              <a:t>Grafcet</a:t>
-            </a:r>
-            <a:r>
-              <a:rPr lang="pt-BR" sz="2200" dirty="0">
-                <a:latin typeface="Times New Roman" panose="02020603050405020304" pitchFamily="18" charset="0"/>
-                <a:cs typeface="Times New Roman" panose="02020603050405020304" pitchFamily="18" charset="0"/>
-              </a:rPr>
-              <a:t> (</a:t>
-            </a:r>
-            <a:r>
-              <a:rPr lang="pt-BR" sz="2200" b="1" dirty="0">
-                <a:latin typeface="Times New Roman" panose="02020603050405020304" pitchFamily="18" charset="0"/>
-                <a:cs typeface="Times New Roman" panose="02020603050405020304" pitchFamily="18" charset="0"/>
-              </a:rPr>
-              <a:t>SFC</a:t>
-            </a:r>
-            <a:r>
-              <a:rPr lang="pt-BR" sz="2200" dirty="0">
-                <a:latin typeface="Times New Roman" panose="02020603050405020304" pitchFamily="18" charset="0"/>
-                <a:cs typeface="Times New Roman" panose="02020603050405020304" pitchFamily="18" charset="0"/>
-              </a:rPr>
-              <a:t>), Texto Estruturado (</a:t>
-            </a:r>
-            <a:r>
-              <a:rPr lang="pt-BR" sz="2200" b="1" dirty="0">
-                <a:latin typeface="Times New Roman" panose="02020603050405020304" pitchFamily="18" charset="0"/>
-                <a:cs typeface="Times New Roman" panose="02020603050405020304" pitchFamily="18" charset="0"/>
-              </a:rPr>
-              <a:t>SCL</a:t>
-            </a:r>
-            <a:r>
-              <a:rPr lang="pt-BR" sz="2200" dirty="0">
-                <a:latin typeface="Times New Roman" panose="02020603050405020304" pitchFamily="18" charset="0"/>
-                <a:cs typeface="Times New Roman" panose="02020603050405020304" pitchFamily="18" charset="0"/>
-              </a:rPr>
-              <a:t>), Lista de Instruções (LI) etc.</a:t>
+              <a:t> </a:t>
             </a:r>
           </a:p>
           <a:p>
@@ -6274,6 +6164,178 @@
                 <a:latin typeface="Times New Roman" panose="02020603050405020304" pitchFamily="18" charset="0"/>
                 <a:cs typeface="Times New Roman" panose="02020603050405020304" pitchFamily="18" charset="0"/>
               </a:rPr>
+              <a:t>Linguagens de programação gráficas e textuais</a:t>
+            </a:r>
+            <a:r>
+              <a:rPr lang="pt-BR" sz="2200" dirty="0">
+                <a:latin typeface="Times New Roman" panose="02020603050405020304" pitchFamily="18" charset="0"/>
+                <a:cs typeface="Times New Roman" panose="02020603050405020304" pitchFamily="18" charset="0"/>
+              </a:rPr>
+              <a:t>: </a:t>
+            </a:r>
+            <a:r>
+              <a:rPr lang="pt-BR" sz="2200" dirty="0" err="1">
+                <a:latin typeface="Times New Roman" panose="02020603050405020304" pitchFamily="18" charset="0"/>
+                <a:cs typeface="Times New Roman" panose="02020603050405020304" pitchFamily="18" charset="0"/>
+              </a:rPr>
+              <a:t>Ladder</a:t>
+            </a:r>
+            <a:r>
+              <a:rPr lang="pt-BR" sz="2200" dirty="0">
+                <a:latin typeface="Times New Roman" panose="02020603050405020304" pitchFamily="18" charset="0"/>
+                <a:cs typeface="Times New Roman" panose="02020603050405020304" pitchFamily="18" charset="0"/>
+              </a:rPr>
+              <a:t> (</a:t>
+            </a:r>
+            <a:r>
+              <a:rPr lang="pt-BR" sz="2200" b="1" dirty="0">
+                <a:latin typeface="Times New Roman" panose="02020603050405020304" pitchFamily="18" charset="0"/>
+                <a:cs typeface="Times New Roman" panose="02020603050405020304" pitchFamily="18" charset="0"/>
+              </a:rPr>
+              <a:t>LD</a:t>
+            </a:r>
+            <a:r>
+              <a:rPr lang="pt-BR" sz="2200" dirty="0">
+                <a:latin typeface="Times New Roman" panose="02020603050405020304" pitchFamily="18" charset="0"/>
+                <a:cs typeface="Times New Roman" panose="02020603050405020304" pitchFamily="18" charset="0"/>
+              </a:rPr>
+              <a:t>) </a:t>
+            </a:r>
+            <a:r>
+              <a:rPr lang="pt-BR" sz="2200" b="1" dirty="0">
+                <a:latin typeface="Times New Roman" panose="02020603050405020304" pitchFamily="18" charset="0"/>
+                <a:cs typeface="Times New Roman" panose="02020603050405020304" pitchFamily="18" charset="0"/>
+              </a:rPr>
+              <a:t>ou Diagrama de Escada</a:t>
+            </a:r>
+            <a:r>
+              <a:rPr lang="pt-BR" sz="2200" dirty="0">
+                <a:latin typeface="Times New Roman" panose="02020603050405020304" pitchFamily="18" charset="0"/>
+                <a:cs typeface="Times New Roman" panose="02020603050405020304" pitchFamily="18" charset="0"/>
+              </a:rPr>
+              <a:t>, Diagrama de Bloco Funcional (</a:t>
+            </a:r>
+            <a:r>
+              <a:rPr lang="pt-BR" sz="2200" b="1" dirty="0">
+                <a:latin typeface="Times New Roman" panose="02020603050405020304" pitchFamily="18" charset="0"/>
+                <a:cs typeface="Times New Roman" panose="02020603050405020304" pitchFamily="18" charset="0"/>
+              </a:rPr>
+              <a:t>FBD</a:t>
+            </a:r>
+            <a:r>
+              <a:rPr lang="pt-BR" sz="2200" dirty="0">
+                <a:latin typeface="Times New Roman" panose="02020603050405020304" pitchFamily="18" charset="0"/>
+                <a:cs typeface="Times New Roman" panose="02020603050405020304" pitchFamily="18" charset="0"/>
+              </a:rPr>
+              <a:t>), </a:t>
+            </a:r>
+            <a:r>
+              <a:rPr lang="pt-BR" sz="2200" dirty="0" err="1">
+                <a:latin typeface="Times New Roman" panose="02020603050405020304" pitchFamily="18" charset="0"/>
+                <a:cs typeface="Times New Roman" panose="02020603050405020304" pitchFamily="18" charset="0"/>
+              </a:rPr>
+              <a:t>Grafcet</a:t>
+            </a:r>
+            <a:r>
+              <a:rPr lang="pt-BR" sz="2200" dirty="0">
+                <a:latin typeface="Times New Roman" panose="02020603050405020304" pitchFamily="18" charset="0"/>
+                <a:cs typeface="Times New Roman" panose="02020603050405020304" pitchFamily="18" charset="0"/>
+              </a:rPr>
+              <a:t> (</a:t>
+            </a:r>
+            <a:r>
+              <a:rPr lang="pt-BR" sz="2200" b="1" dirty="0">
+                <a:latin typeface="Times New Roman" panose="02020603050405020304" pitchFamily="18" charset="0"/>
+                <a:cs typeface="Times New Roman" panose="02020603050405020304" pitchFamily="18" charset="0"/>
+              </a:rPr>
+              <a:t>SFC</a:t>
+            </a:r>
+            <a:r>
+              <a:rPr lang="pt-BR" sz="2200" dirty="0">
+                <a:latin typeface="Times New Roman" panose="02020603050405020304" pitchFamily="18" charset="0"/>
+                <a:cs typeface="Times New Roman" panose="02020603050405020304" pitchFamily="18" charset="0"/>
+              </a:rPr>
+              <a:t>) Diagrama de Fluxo, Texto Estruturado </a:t>
+            </a:r>
+            <a:r>
+              <a:rPr lang="pt-BR" sz="2200">
+                <a:latin typeface="Times New Roman" panose="02020603050405020304" pitchFamily="18" charset="0"/>
+                <a:cs typeface="Times New Roman" panose="02020603050405020304" pitchFamily="18" charset="0"/>
+              </a:rPr>
+              <a:t>(</a:t>
+            </a:r>
+            <a:r>
+              <a:rPr lang="pt-BR" sz="2200" b="1">
+                <a:latin typeface="Times New Roman" panose="02020603050405020304" pitchFamily="18" charset="0"/>
+                <a:cs typeface="Times New Roman" panose="02020603050405020304" pitchFamily="18" charset="0"/>
+              </a:rPr>
+              <a:t>ST ou SCL</a:t>
+            </a:r>
+            <a:r>
+              <a:rPr lang="pt-BR" sz="2200">
+                <a:latin typeface="Times New Roman" panose="02020603050405020304" pitchFamily="18" charset="0"/>
+                <a:cs typeface="Times New Roman" panose="02020603050405020304" pitchFamily="18" charset="0"/>
+              </a:rPr>
+              <a:t>), </a:t>
+            </a:r>
+            <a:r>
+              <a:rPr lang="pt-BR" sz="2200" dirty="0">
+                <a:latin typeface="Times New Roman" panose="02020603050405020304" pitchFamily="18" charset="0"/>
+                <a:cs typeface="Times New Roman" panose="02020603050405020304" pitchFamily="18" charset="0"/>
+              </a:rPr>
+              <a:t>Lista de Instruções </a:t>
+            </a:r>
+            <a:r>
+              <a:rPr lang="pt-BR" sz="2200">
+                <a:latin typeface="Times New Roman" panose="02020603050405020304" pitchFamily="18" charset="0"/>
+                <a:cs typeface="Times New Roman" panose="02020603050405020304" pitchFamily="18" charset="0"/>
+              </a:rPr>
+              <a:t>(</a:t>
+            </a:r>
+            <a:r>
+              <a:rPr lang="pt-BR" sz="2200" b="1">
+                <a:latin typeface="Times New Roman" panose="02020603050405020304" pitchFamily="18" charset="0"/>
+                <a:cs typeface="Times New Roman" panose="02020603050405020304" pitchFamily="18" charset="0"/>
+              </a:rPr>
+              <a:t>IL ou STL</a:t>
+            </a:r>
+            <a:r>
+              <a:rPr lang="pt-BR" sz="2200">
+                <a:latin typeface="Times New Roman" panose="02020603050405020304" pitchFamily="18" charset="0"/>
+                <a:cs typeface="Times New Roman" panose="02020603050405020304" pitchFamily="18" charset="0"/>
+              </a:rPr>
+              <a:t>) </a:t>
+            </a:r>
+            <a:r>
+              <a:rPr lang="pt-BR" sz="2200" dirty="0">
+                <a:latin typeface="Times New Roman" panose="02020603050405020304" pitchFamily="18" charset="0"/>
+                <a:cs typeface="Times New Roman" panose="02020603050405020304" pitchFamily="18" charset="0"/>
+              </a:rPr>
+              <a:t>etc.</a:t>
+            </a:r>
+          </a:p>
+          <a:p>
+            <a:pPr marL="0" indent="0" algn="just">
+              <a:buNone/>
+            </a:pPr>
+            <a:endParaRPr lang="pt-BR" sz="2200" dirty="0">
+              <a:latin typeface="Times New Roman" panose="02020603050405020304" pitchFamily="18" charset="0"/>
+              <a:cs typeface="Times New Roman" panose="02020603050405020304" pitchFamily="18" charset="0"/>
+            </a:endParaRPr>
+          </a:p>
+          <a:p>
+            <a:pPr algn="just">
+              <a:buFont typeface="Wingdings" panose="05000000000000000000" pitchFamily="2" charset="2"/>
+              <a:buChar char="v"/>
+            </a:pPr>
+            <a:r>
+              <a:rPr lang="pt-BR" sz="2200" b="1" dirty="0">
+                <a:solidFill>
+                  <a:srgbClr val="FF0000"/>
+                </a:solidFill>
+                <a:latin typeface="Times New Roman" panose="02020603050405020304" pitchFamily="18" charset="0"/>
+                <a:cs typeface="Times New Roman" panose="02020603050405020304" pitchFamily="18" charset="0"/>
+              </a:rPr>
               <a:t>Exemplo</a:t>
             </a:r>
             <a:r>
@@ -6304,7 +6366,7 @@
               <a:t>Ladder</a:t>
             </a:r>
             <a:r>
-              <a:rPr lang="pt-BR" sz="2200" b="1">
+              <a:rPr lang="pt-BR" sz="2200" b="1" dirty="0">
                 <a:solidFill>
                   <a:srgbClr val="FF0000"/>
                 </a:solidFill>
@@ -6314,24 +6376,14 @@
               <a:t>: </a:t>
             </a:r>
             <a:r>
-              <a:rPr lang="pt-BR" sz="2200">
+              <a:rPr lang="pt-BR" sz="2200" dirty="0">
                 <a:solidFill>
                   <a:schemeClr val="tx1"/>
                 </a:solidFill>
                 <a:latin typeface="Times New Roman" panose="02020603050405020304" pitchFamily="18" charset="0"/>
                 <a:cs typeface="Times New Roman" panose="02020603050405020304" pitchFamily="18" charset="0"/>
               </a:rPr>
-              <a:t>Controle </a:t>
-            </a:r>
-            <a:r>
-              <a:rPr lang="pt-BR" sz="2200" dirty="0">
-                <a:solidFill>
-                  <a:schemeClr val="tx1"/>
-                </a:solidFill>
-                <a:latin typeface="Times New Roman" panose="02020603050405020304" pitchFamily="18" charset="0"/>
-                <a:cs typeface="Times New Roman" panose="02020603050405020304" pitchFamily="18" charset="0"/>
-              </a:rPr>
-              <a:t>de um motor</a:t>
+              <a:t>Controle de um motor</a:t>
             </a:r>
             <a:r>
               <a:rPr lang="pt-BR" sz="2200" dirty="0">

</xml_diff>